<commit_message>
Updated N5, add La1
</commit_message>
<xml_diff>
--- a/Networks/Networks5.pptx
+++ b/Networks/Networks5.pptx
@@ -21,6 +21,7 @@
     <p:sldId id="394" r:id="rId15"/>
     <p:sldId id="395" r:id="rId16"/>
     <p:sldId id="396" r:id="rId17"/>
+    <p:sldId id="397" r:id="rId18"/>
   </p:sldIdLst>
   <p:sldSz cx="12192000" cy="6858000"/>
   <p:notesSz cx="6858000" cy="9144000"/>
@@ -276,7 +277,7 @@
           <a:p>
             <a:fld id="{EC791C76-AA82-7C46-80D9-126AEF1F9BF6}" type="datetimeFigureOut">
               <a:rPr lang="en-RU" smtClean="0"/>
-              <a:t>05.12.2020</a:t>
+              <a:t>07.12.2020</a:t>
             </a:fld>
             <a:endParaRPr lang="en-RU"/>
           </a:p>
@@ -476,7 +477,7 @@
           <a:p>
             <a:fld id="{EC791C76-AA82-7C46-80D9-126AEF1F9BF6}" type="datetimeFigureOut">
               <a:rPr lang="en-RU" smtClean="0"/>
-              <a:t>05.12.2020</a:t>
+              <a:t>07.12.2020</a:t>
             </a:fld>
             <a:endParaRPr lang="en-RU"/>
           </a:p>
@@ -686,7 +687,7 @@
           <a:p>
             <a:fld id="{EC791C76-AA82-7C46-80D9-126AEF1F9BF6}" type="datetimeFigureOut">
               <a:rPr lang="en-RU" smtClean="0"/>
-              <a:t>05.12.2020</a:t>
+              <a:t>07.12.2020</a:t>
             </a:fld>
             <a:endParaRPr lang="en-RU"/>
           </a:p>
@@ -1153,7 +1154,7 @@
           <a:p>
             <a:fld id="{EC791C76-AA82-7C46-80D9-126AEF1F9BF6}" type="datetimeFigureOut">
               <a:rPr lang="en-RU" smtClean="0"/>
-              <a:t>05.12.2020</a:t>
+              <a:t>07.12.2020</a:t>
             </a:fld>
             <a:endParaRPr lang="en-RU"/>
           </a:p>
@@ -1429,7 +1430,7 @@
           <a:p>
             <a:fld id="{EC791C76-AA82-7C46-80D9-126AEF1F9BF6}" type="datetimeFigureOut">
               <a:rPr lang="en-RU" smtClean="0"/>
-              <a:t>05.12.2020</a:t>
+              <a:t>07.12.2020</a:t>
             </a:fld>
             <a:endParaRPr lang="en-RU"/>
           </a:p>
@@ -1697,7 +1698,7 @@
           <a:p>
             <a:fld id="{EC791C76-AA82-7C46-80D9-126AEF1F9BF6}" type="datetimeFigureOut">
               <a:rPr lang="en-RU" smtClean="0"/>
-              <a:t>05.12.2020</a:t>
+              <a:t>07.12.2020</a:t>
             </a:fld>
             <a:endParaRPr lang="en-RU"/>
           </a:p>
@@ -2112,7 +2113,7 @@
           <a:p>
             <a:fld id="{EC791C76-AA82-7C46-80D9-126AEF1F9BF6}" type="datetimeFigureOut">
               <a:rPr lang="en-RU" smtClean="0"/>
-              <a:t>05.12.2020</a:t>
+              <a:t>07.12.2020</a:t>
             </a:fld>
             <a:endParaRPr lang="en-RU"/>
           </a:p>
@@ -2254,7 +2255,7 @@
           <a:p>
             <a:fld id="{EC791C76-AA82-7C46-80D9-126AEF1F9BF6}" type="datetimeFigureOut">
               <a:rPr lang="en-RU" smtClean="0"/>
-              <a:t>05.12.2020</a:t>
+              <a:t>07.12.2020</a:t>
             </a:fld>
             <a:endParaRPr lang="en-RU"/>
           </a:p>
@@ -2367,7 +2368,7 @@
           <a:p>
             <a:fld id="{EC791C76-AA82-7C46-80D9-126AEF1F9BF6}" type="datetimeFigureOut">
               <a:rPr lang="en-RU" smtClean="0"/>
-              <a:t>05.12.2020</a:t>
+              <a:t>07.12.2020</a:t>
             </a:fld>
             <a:endParaRPr lang="en-RU"/>
           </a:p>
@@ -2680,7 +2681,7 @@
           <a:p>
             <a:fld id="{EC791C76-AA82-7C46-80D9-126AEF1F9BF6}" type="datetimeFigureOut">
               <a:rPr lang="en-RU" smtClean="0"/>
-              <a:t>05.12.2020</a:t>
+              <a:t>07.12.2020</a:t>
             </a:fld>
             <a:endParaRPr lang="en-RU"/>
           </a:p>
@@ -2969,7 +2970,7 @@
           <a:p>
             <a:fld id="{EC791C76-AA82-7C46-80D9-126AEF1F9BF6}" type="datetimeFigureOut">
               <a:rPr lang="en-RU" smtClean="0"/>
-              <a:t>05.12.2020</a:t>
+              <a:t>07.12.2020</a:t>
             </a:fld>
             <a:endParaRPr lang="en-RU"/>
           </a:p>
@@ -3212,7 +3213,7 @@
           <a:p>
             <a:fld id="{EC791C76-AA82-7C46-80D9-126AEF1F9BF6}" type="datetimeFigureOut">
               <a:rPr lang="en-RU" smtClean="0"/>
-              <a:t>05.12.2020</a:t>
+              <a:t>07.12.2020</a:t>
             </a:fld>
             <a:endParaRPr lang="en-RU"/>
           </a:p>
@@ -4600,6 +4601,93 @@
 </p:sld>
 </file>
 
+<file path=ppt/slides/slide17.xml><?xml version="1.0" encoding="utf-8"?>
+<p:sld xmlns:a="http://schemas.openxmlformats.org/drawingml/2006/main" xmlns:r="http://schemas.openxmlformats.org/officeDocument/2006/relationships" xmlns:p="http://schemas.openxmlformats.org/presentationml/2006/main">
+  <p:cSld>
+    <p:spTree>
+      <p:nvGrpSpPr>
+        <p:cNvPr id="1" name=""/>
+        <p:cNvGrpSpPr/>
+        <p:nvPr/>
+      </p:nvGrpSpPr>
+      <p:grpSpPr>
+        <a:xfrm>
+          <a:off x="0" y="0"/>
+          <a:ext cx="0" cy="0"/>
+          <a:chOff x="0" y="0"/>
+          <a:chExt cx="0" cy="0"/>
+        </a:xfrm>
+      </p:grpSpPr>
+      <p:sp>
+        <p:nvSpPr>
+          <p:cNvPr id="3" name="Text Placeholder 2">
+            <a:extLst>
+              <a:ext uri="{FF2B5EF4-FFF2-40B4-BE49-F238E27FC236}">
+                <a16:creationId xmlns:a16="http://schemas.microsoft.com/office/drawing/2014/main" id="{E59FF512-CD71-4630-958A-B31332A32AAE}"/>
+              </a:ext>
+            </a:extLst>
+          </p:cNvPr>
+          <p:cNvSpPr>
+            <a:spLocks noGrp="1"/>
+          </p:cNvSpPr>
+          <p:nvPr>
+            <p:ph type="body" sz="quarter" idx="10"/>
+          </p:nvPr>
+        </p:nvSpPr>
+        <p:spPr/>
+        <p:txBody>
+          <a:bodyPr/>
+          <a:lstStyle/>
+          <a:p>
+            <a:r>
+              <a:rPr lang="en-US" dirty="0"/>
+              <a:t>FTP file transfer protocol</a:t>
+            </a:r>
+          </a:p>
+        </p:txBody>
+      </p:sp>
+      <p:pic>
+        <p:nvPicPr>
+          <p:cNvPr id="2" name="Content Placeholder 1">
+            <a:extLst>
+              <a:ext uri="{FF2B5EF4-FFF2-40B4-BE49-F238E27FC236}">
+                <a16:creationId xmlns:a16="http://schemas.microsoft.com/office/drawing/2014/main" id="{6190F35A-A18D-E74C-826A-C5B62D8CB8C5}"/>
+              </a:ext>
+            </a:extLst>
+          </p:cNvPr>
+          <p:cNvPicPr>
+            <a:picLocks noGrp="1" noChangeAspect="1"/>
+          </p:cNvPicPr>
+          <p:nvPr>
+            <p:ph idx="1"/>
+          </p:nvPr>
+        </p:nvPicPr>
+        <p:blipFill>
+          <a:blip r:embed="rId2"/>
+          <a:stretch>
+            <a:fillRect/>
+          </a:stretch>
+        </p:blipFill>
+        <p:spPr>
+          <a:xfrm>
+            <a:off x="385012" y="1269572"/>
+            <a:ext cx="7922495" cy="5263575"/>
+          </a:xfrm>
+        </p:spPr>
+      </p:pic>
+    </p:spTree>
+    <p:extLst>
+      <p:ext uri="{BB962C8B-B14F-4D97-AF65-F5344CB8AC3E}">
+        <p14:creationId xmlns:p14="http://schemas.microsoft.com/office/powerpoint/2010/main" val="729301361"/>
+      </p:ext>
+    </p:extLst>
+  </p:cSld>
+  <p:clrMapOvr>
+    <a:masterClrMapping/>
+  </p:clrMapOvr>
+</p:sld>
+</file>
+
 <file path=ppt/slides/slide2.xml><?xml version="1.0" encoding="utf-8"?>
 <p:sld xmlns:a="http://schemas.openxmlformats.org/drawingml/2006/main" xmlns:r="http://schemas.openxmlformats.org/officeDocument/2006/relationships" xmlns:p="http://schemas.openxmlformats.org/presentationml/2006/main">
   <p:cSld>
@@ -5554,7 +5642,7 @@
           <a:p>
             <a:r>
               <a:rPr lang="en-US" dirty="0"/>
-              <a:t>URL</a:t>
+              <a:t>URL unified resource locator / identifier</a:t>
             </a:r>
           </a:p>
         </p:txBody>
@@ -5633,15 +5721,7 @@
             </a:r>
             <a:r>
               <a:rPr lang="en-US" sz="2400" dirty="0"/>
-              <a:t>("https://</a:t>
-            </a:r>
-            <a:r>
-              <a:rPr lang="en-US" sz="2400" dirty="0" err="1"/>
-              <a:t>yandex.ru</a:t>
-            </a:r>
-            <a:r>
-              <a:rPr lang="en-US" sz="2400" dirty="0"/>
-              <a:t>/</a:t>
+              <a:t>("https://yandex.ru:8443/</a:t>
             </a:r>
             <a:r>
               <a:rPr lang="en-US" sz="2400" dirty="0" err="1"/>
@@ -5702,6 +5782,41 @@
               <a:latin typeface="Trebuchet MS"/>
               <a:cs typeface="Trebuchet MS"/>
             </a:endParaRPr>
+          </a:p>
+        </p:txBody>
+      </p:sp>
+      <p:sp>
+        <p:nvSpPr>
+          <p:cNvPr id="4" name="TextBox 3">
+            <a:extLst>
+              <a:ext uri="{FF2B5EF4-FFF2-40B4-BE49-F238E27FC236}">
+                <a16:creationId xmlns:a16="http://schemas.microsoft.com/office/drawing/2014/main" id="{3A3A7ED0-948E-444C-8A1A-4A017D5673CA}"/>
+              </a:ext>
+            </a:extLst>
+          </p:cNvPr>
+          <p:cNvSpPr txBox="1"/>
+          <p:nvPr/>
+        </p:nvSpPr>
+        <p:spPr>
+          <a:xfrm>
+            <a:off x="755904" y="6400800"/>
+            <a:ext cx="2394502" cy="369332"/>
+          </a:xfrm>
+          <a:prstGeom prst="rect">
+            <a:avLst/>
+          </a:prstGeom>
+          <a:noFill/>
+        </p:spPr>
+        <p:txBody>
+          <a:bodyPr wrap="none" rtlCol="0">
+            <a:spAutoFit/>
+          </a:bodyPr>
+          <a:lstStyle/>
+          <a:p>
+            <a:r>
+              <a:rPr lang="en-RU" dirty="0"/>
+              <a:t>https -&gt; 443 ; http -&gt; 80</a:t>
+            </a:r>
           </a:p>
         </p:txBody>
       </p:sp>

</xml_diff>